<commit_message>
Adding slides week 6
</commit_message>
<xml_diff>
--- a/course_materials/week6/Slides/spatial_regression.pptx
+++ b/course_materials/week6/Slides/spatial_regression.pptx
@@ -1626,8 +1626,8 @@
         </p:nvSpPr>
         <p:spPr>
           <a:xfrm>
-            <a:off x="1371599" y="764280"/>
-            <a:ext cx="5028480" cy="3771360"/>
+            <a:off x="1371600" y="763588"/>
+            <a:ext cx="5029200" cy="3771900"/>
           </a:xfrm>
           <a:solidFill>
             <a:srgbClr val="729FCF"/>
@@ -18656,6 +18656,34 @@
               <a:t>Week 6</a:t>
             </a:r>
           </a:p>
+          <a:p>
+            <a:pPr marL="0" lvl="0" indent="0" algn="r">
+              <a:spcBef>
+                <a:spcPts val="1199"/>
+              </a:spcBef>
+              <a:spcAft>
+                <a:spcPts val="201"/>
+              </a:spcAft>
+              <a:buNone/>
+              <a:tabLst>
+                <a:tab pos="0" algn="l"/>
+              </a:tabLst>
+            </a:pPr>
+            <a:r>
+              <a:rPr lang="en-US" sz="2400" cap="all" spc="201" dirty="0">
+                <a:solidFill>
+                  <a:srgbClr val="344068"/>
+                </a:solidFill>
+                <a:highlight>
+                  <a:scrgbClr r="0" g="0" b="0">
+                    <a:alpha val="0"/>
+                  </a:scrgbClr>
+                </a:highlight>
+                <a:latin typeface="Calibri Light" pitchFamily="18"/>
+              </a:rPr>
+              <a:t>Hugh Sturrock</a:t>
+            </a:r>
+          </a:p>
         </p:txBody>
       </p:sp>
     </p:spTree>
@@ -20719,10 +20747,10 @@
       </p:sp>
       <p:pic>
         <p:nvPicPr>
-          <p:cNvPr id="4" name="">
-            <a:extLst>
-              <a:ext uri="{FF2B5EF4-FFF2-40B4-BE49-F238E27FC236}">
-                <a16:creationId xmlns:a16="http://schemas.microsoft.com/office/drawing/2014/main" id="{BA5154F4-B58D-704A-831B-DFB3CA539F44}"/>
+          <p:cNvPr id="6" name="Picture 5">
+            <a:extLst>
+              <a:ext uri="{FF2B5EF4-FFF2-40B4-BE49-F238E27FC236}">
+                <a16:creationId xmlns:a16="http://schemas.microsoft.com/office/drawing/2014/main" id="{0020D1D4-D91F-D14D-B3F2-51B7D904F146}"/>
               </a:ext>
             </a:extLst>
           </p:cNvPr>
@@ -20732,27 +20760,19 @@
           <p:nvPr/>
         </p:nvPicPr>
         <p:blipFill>
-          <a:blip r:embed="rId3">
-            <a:lum/>
-            <a:alphaModFix/>
-          </a:blip>
-          <a:srcRect/>
+          <a:blip r:embed="rId3"/>
           <a:stretch>
             <a:fillRect/>
           </a:stretch>
         </p:blipFill>
         <p:spPr>
           <a:xfrm>
-            <a:off x="2742840" y="1737359"/>
-            <a:ext cx="6401160" cy="4572000"/>
+            <a:off x="3297849" y="2059145"/>
+            <a:ext cx="5271452" cy="3886006"/>
           </a:xfrm>
           <a:prstGeom prst="rect">
             <a:avLst/>
           </a:prstGeom>
-          <a:noFill/>
-          <a:ln>
-            <a:noFill/>
-          </a:ln>
         </p:spPr>
       </p:pic>
     </p:spTree>

</xml_diff>

<commit_message>
Updating slides week 6
</commit_message>
<xml_diff>
--- a/course_materials/week6/Slides/spatial_regression.pptx
+++ b/course_materials/week6/Slides/spatial_regression.pptx
@@ -9,10 +9,10 @@
     <p:sldMasterId id="2147483696" r:id="rId5"/>
   </p:sldMasterIdLst>
   <p:notesMasterIdLst>
-    <p:notesMasterId r:id="rId22"/>
+    <p:notesMasterId r:id="rId23"/>
   </p:notesMasterIdLst>
   <p:handoutMasterIdLst>
-    <p:handoutMasterId r:id="rId23"/>
+    <p:handoutMasterId r:id="rId24"/>
   </p:handoutMasterIdLst>
   <p:sldIdLst>
     <p:sldId id="256" r:id="rId6"/>
@@ -26,11 +26,12 @@
     <p:sldId id="264" r:id="rId14"/>
     <p:sldId id="265" r:id="rId15"/>
     <p:sldId id="266" r:id="rId16"/>
-    <p:sldId id="267" r:id="rId17"/>
-    <p:sldId id="268" r:id="rId18"/>
-    <p:sldId id="269" r:id="rId19"/>
-    <p:sldId id="270" r:id="rId20"/>
-    <p:sldId id="271" r:id="rId21"/>
+    <p:sldId id="272" r:id="rId17"/>
+    <p:sldId id="267" r:id="rId18"/>
+    <p:sldId id="268" r:id="rId19"/>
+    <p:sldId id="269" r:id="rId20"/>
+    <p:sldId id="270" r:id="rId21"/>
+    <p:sldId id="271" r:id="rId22"/>
   </p:sldIdLst>
   <p:sldSz cx="9144000" cy="6858000"/>
   <p:notesSz cx="6858000" cy="9144000"/>
@@ -1120,7 +1121,7 @@
           <p:cNvPr id="7" name="Slide Number Placeholder 6">
             <a:extLst>
               <a:ext uri="{FF2B5EF4-FFF2-40B4-BE49-F238E27FC236}">
-                <a16:creationId xmlns:a16="http://schemas.microsoft.com/office/drawing/2014/main" id="{9C6E705F-0D40-7D4D-A33D-0F83D722C694}"/>
+                <a16:creationId xmlns:a16="http://schemas.microsoft.com/office/drawing/2014/main" id="{9205CDEA-A4EE-BE48-B3BF-3C6E54BD01AA}"/>
               </a:ext>
             </a:extLst>
           </p:cNvPr>
@@ -1141,7 +1142,7 @@
           <a:lstStyle/>
           <a:p>
             <a:pPr lvl="0"/>
-            <a:fld id="{F2F8103E-6278-BD43-B7D5-742640101AC8}" type="slidenum">
+            <a:fld id="{C9D78E36-BB6C-694F-BD60-3580EB4C1379}" type="slidenum">
               <a:t>12</a:t>
             </a:fld>
             <a:endParaRPr lang="en-US"/>
@@ -1153,7 +1154,7 @@
           <p:cNvPr id="2" name="Slide Image Placeholder 1">
             <a:extLst>
               <a:ext uri="{FF2B5EF4-FFF2-40B4-BE49-F238E27FC236}">
-                <a16:creationId xmlns:a16="http://schemas.microsoft.com/office/drawing/2014/main" id="{F83EDA28-87F8-AC40-9E79-3BF8DBC0DA80}"/>
+                <a16:creationId xmlns:a16="http://schemas.microsoft.com/office/drawing/2014/main" id="{A697DFAF-961B-774F-8E5C-2CAB733F99A3}"/>
               </a:ext>
             </a:extLst>
           </p:cNvPr>
@@ -1166,8 +1167,8 @@
         </p:nvSpPr>
         <p:spPr>
           <a:xfrm>
-            <a:off x="1371599" y="764280"/>
-            <a:ext cx="5028480" cy="3771360"/>
+            <a:off x="1371600" y="763588"/>
+            <a:ext cx="5029200" cy="3771900"/>
           </a:xfrm>
           <a:solidFill>
             <a:srgbClr val="729FCF"/>
@@ -1185,7 +1186,7 @@
           <p:cNvPr id="3" name="Notes Placeholder 2">
             <a:extLst>
               <a:ext uri="{FF2B5EF4-FFF2-40B4-BE49-F238E27FC236}">
-                <a16:creationId xmlns:a16="http://schemas.microsoft.com/office/drawing/2014/main" id="{A329260D-CF10-0446-A855-C4ED755E65F3}"/>
+                <a16:creationId xmlns:a16="http://schemas.microsoft.com/office/drawing/2014/main" id="{6F331A5C-9C63-A84C-A55D-E02AC530DC47}"/>
               </a:ext>
             </a:extLst>
           </p:cNvPr>
@@ -1206,6 +1207,11 @@
         </p:txBody>
       </p:sp>
     </p:spTree>
+    <p:extLst>
+      <p:ext uri="{BB962C8B-B14F-4D97-AF65-F5344CB8AC3E}">
+        <p14:creationId xmlns:p14="http://schemas.microsoft.com/office/powerpoint/2010/main" val="3633743731"/>
+      </p:ext>
+    </p:extLst>
   </p:cSld>
   <p:clrMapOvr>
     <a:masterClrMapping/>
@@ -1235,7 +1241,7 @@
           <p:cNvPr id="7" name="Slide Number Placeholder 6">
             <a:extLst>
               <a:ext uri="{FF2B5EF4-FFF2-40B4-BE49-F238E27FC236}">
-                <a16:creationId xmlns:a16="http://schemas.microsoft.com/office/drawing/2014/main" id="{C572C392-EAE0-CC49-91D0-EFBAB6693649}"/>
+                <a16:creationId xmlns:a16="http://schemas.microsoft.com/office/drawing/2014/main" id="{9C6E705F-0D40-7D4D-A33D-0F83D722C694}"/>
               </a:ext>
             </a:extLst>
           </p:cNvPr>
@@ -1256,7 +1262,7 @@
           <a:lstStyle/>
           <a:p>
             <a:pPr lvl="0"/>
-            <a:fld id="{7642947A-7580-D742-A0E1-C2A1C2E51C9A}" type="slidenum">
+            <a:fld id="{F2F8103E-6278-BD43-B7D5-742640101AC8}" type="slidenum">
               <a:t>13</a:t>
             </a:fld>
             <a:endParaRPr lang="en-US"/>
@@ -1268,7 +1274,7 @@
           <p:cNvPr id="2" name="Slide Image Placeholder 1">
             <a:extLst>
               <a:ext uri="{FF2B5EF4-FFF2-40B4-BE49-F238E27FC236}">
-                <a16:creationId xmlns:a16="http://schemas.microsoft.com/office/drawing/2014/main" id="{F4D016CD-7263-B74D-BB67-23D5CC991443}"/>
+                <a16:creationId xmlns:a16="http://schemas.microsoft.com/office/drawing/2014/main" id="{F83EDA28-87F8-AC40-9E79-3BF8DBC0DA80}"/>
               </a:ext>
             </a:extLst>
           </p:cNvPr>
@@ -1300,7 +1306,7 @@
           <p:cNvPr id="3" name="Notes Placeholder 2">
             <a:extLst>
               <a:ext uri="{FF2B5EF4-FFF2-40B4-BE49-F238E27FC236}">
-                <a16:creationId xmlns:a16="http://schemas.microsoft.com/office/drawing/2014/main" id="{90FF74D7-D03C-3C40-BD31-E13D2F57B7D3}"/>
+                <a16:creationId xmlns:a16="http://schemas.microsoft.com/office/drawing/2014/main" id="{A329260D-CF10-0446-A855-C4ED755E65F3}"/>
               </a:ext>
             </a:extLst>
           </p:cNvPr>
@@ -1350,7 +1356,7 @@
           <p:cNvPr id="7" name="Slide Number Placeholder 6">
             <a:extLst>
               <a:ext uri="{FF2B5EF4-FFF2-40B4-BE49-F238E27FC236}">
-                <a16:creationId xmlns:a16="http://schemas.microsoft.com/office/drawing/2014/main" id="{B9683B45-295E-1C48-8F7E-D785FA17EBA9}"/>
+                <a16:creationId xmlns:a16="http://schemas.microsoft.com/office/drawing/2014/main" id="{C572C392-EAE0-CC49-91D0-EFBAB6693649}"/>
               </a:ext>
             </a:extLst>
           </p:cNvPr>
@@ -1371,7 +1377,7 @@
           <a:lstStyle/>
           <a:p>
             <a:pPr lvl="0"/>
-            <a:fld id="{F1C4647D-D6D3-684A-92BA-0FDE6F410531}" type="slidenum">
+            <a:fld id="{7642947A-7580-D742-A0E1-C2A1C2E51C9A}" type="slidenum">
               <a:t>14</a:t>
             </a:fld>
             <a:endParaRPr lang="en-US"/>
@@ -1383,7 +1389,7 @@
           <p:cNvPr id="2" name="Slide Image Placeholder 1">
             <a:extLst>
               <a:ext uri="{FF2B5EF4-FFF2-40B4-BE49-F238E27FC236}">
-                <a16:creationId xmlns:a16="http://schemas.microsoft.com/office/drawing/2014/main" id="{BF027D86-1B0E-EF41-AE48-6F441040B4C1}"/>
+                <a16:creationId xmlns:a16="http://schemas.microsoft.com/office/drawing/2014/main" id="{F4D016CD-7263-B74D-BB67-23D5CC991443}"/>
               </a:ext>
             </a:extLst>
           </p:cNvPr>
@@ -1396,8 +1402,8 @@
         </p:nvSpPr>
         <p:spPr>
           <a:xfrm>
-            <a:off x="1371600" y="763588"/>
-            <a:ext cx="5029200" cy="3771900"/>
+            <a:off x="1371599" y="764280"/>
+            <a:ext cx="5028480" cy="3771360"/>
           </a:xfrm>
           <a:solidFill>
             <a:srgbClr val="729FCF"/>
@@ -1415,7 +1421,7 @@
           <p:cNvPr id="3" name="Notes Placeholder 2">
             <a:extLst>
               <a:ext uri="{FF2B5EF4-FFF2-40B4-BE49-F238E27FC236}">
-                <a16:creationId xmlns:a16="http://schemas.microsoft.com/office/drawing/2014/main" id="{B1D1402A-C20A-594B-8895-09C8A0B9CB0D}"/>
+                <a16:creationId xmlns:a16="http://schemas.microsoft.com/office/drawing/2014/main" id="{90FF74D7-D03C-3C40-BD31-E13D2F57B7D3}"/>
               </a:ext>
             </a:extLst>
           </p:cNvPr>
@@ -1465,7 +1471,7 @@
           <p:cNvPr id="7" name="Slide Number Placeholder 6">
             <a:extLst>
               <a:ext uri="{FF2B5EF4-FFF2-40B4-BE49-F238E27FC236}">
-                <a16:creationId xmlns:a16="http://schemas.microsoft.com/office/drawing/2014/main" id="{D2D7E2C2-A773-064C-A45E-E603F3DAE613}"/>
+                <a16:creationId xmlns:a16="http://schemas.microsoft.com/office/drawing/2014/main" id="{B9683B45-295E-1C48-8F7E-D785FA17EBA9}"/>
               </a:ext>
             </a:extLst>
           </p:cNvPr>
@@ -1486,7 +1492,7 @@
           <a:lstStyle/>
           <a:p>
             <a:pPr lvl="0"/>
-            <a:fld id="{FE803B09-9B77-C54F-B1D8-CFDF1023C3D8}" type="slidenum">
+            <a:fld id="{F1C4647D-D6D3-684A-92BA-0FDE6F410531}" type="slidenum">
               <a:t>15</a:t>
             </a:fld>
             <a:endParaRPr lang="en-US"/>
@@ -1498,7 +1504,7 @@
           <p:cNvPr id="2" name="Slide Image Placeholder 1">
             <a:extLst>
               <a:ext uri="{FF2B5EF4-FFF2-40B4-BE49-F238E27FC236}">
-                <a16:creationId xmlns:a16="http://schemas.microsoft.com/office/drawing/2014/main" id="{9EF1CEB9-D2C2-344D-9379-CE1227E54668}"/>
+                <a16:creationId xmlns:a16="http://schemas.microsoft.com/office/drawing/2014/main" id="{BF027D86-1B0E-EF41-AE48-6F441040B4C1}"/>
               </a:ext>
             </a:extLst>
           </p:cNvPr>
@@ -1530,7 +1536,7 @@
           <p:cNvPr id="3" name="Notes Placeholder 2">
             <a:extLst>
               <a:ext uri="{FF2B5EF4-FFF2-40B4-BE49-F238E27FC236}">
-                <a16:creationId xmlns:a16="http://schemas.microsoft.com/office/drawing/2014/main" id="{D00EA85E-08E4-A942-887F-71BDC8D5096B}"/>
+                <a16:creationId xmlns:a16="http://schemas.microsoft.com/office/drawing/2014/main" id="{B1D1402A-C20A-594B-8895-09C8A0B9CB0D}"/>
               </a:ext>
             </a:extLst>
           </p:cNvPr>
@@ -1580,7 +1586,7 @@
           <p:cNvPr id="7" name="Slide Number Placeholder 6">
             <a:extLst>
               <a:ext uri="{FF2B5EF4-FFF2-40B4-BE49-F238E27FC236}">
-                <a16:creationId xmlns:a16="http://schemas.microsoft.com/office/drawing/2014/main" id="{2F510149-13A2-124D-8AAA-822788858C6B}"/>
+                <a16:creationId xmlns:a16="http://schemas.microsoft.com/office/drawing/2014/main" id="{D2D7E2C2-A773-064C-A45E-E603F3DAE613}"/>
               </a:ext>
             </a:extLst>
           </p:cNvPr>
@@ -1601,8 +1607,123 @@
           <a:lstStyle/>
           <a:p>
             <a:pPr lvl="0"/>
+            <a:fld id="{FE803B09-9B77-C54F-B1D8-CFDF1023C3D8}" type="slidenum">
+              <a:t>16</a:t>
+            </a:fld>
+            <a:endParaRPr lang="en-US"/>
+          </a:p>
+        </p:txBody>
+      </p:sp>
+      <p:sp>
+        <p:nvSpPr>
+          <p:cNvPr id="2" name="Slide Image Placeholder 1">
+            <a:extLst>
+              <a:ext uri="{FF2B5EF4-FFF2-40B4-BE49-F238E27FC236}">
+                <a16:creationId xmlns:a16="http://schemas.microsoft.com/office/drawing/2014/main" id="{9EF1CEB9-D2C2-344D-9379-CE1227E54668}"/>
+              </a:ext>
+            </a:extLst>
+          </p:cNvPr>
+          <p:cNvSpPr>
+            <a:spLocks noGrp="1" noRot="1" noChangeAspect="1" noResize="1"/>
+          </p:cNvSpPr>
+          <p:nvPr>
+            <p:ph type="sldImg"/>
+          </p:nvPr>
+        </p:nvSpPr>
+        <p:spPr>
+          <a:xfrm>
+            <a:off x="1371600" y="763588"/>
+            <a:ext cx="5029200" cy="3771900"/>
+          </a:xfrm>
+          <a:solidFill>
+            <a:srgbClr val="729FCF"/>
+          </a:solidFill>
+          <a:ln w="25400">
+            <a:solidFill>
+              <a:srgbClr val="3465A4"/>
+            </a:solidFill>
+            <a:prstDash val="solid"/>
+          </a:ln>
+        </p:spPr>
+      </p:sp>
+      <p:sp>
+        <p:nvSpPr>
+          <p:cNvPr id="3" name="Notes Placeholder 2">
+            <a:extLst>
+              <a:ext uri="{FF2B5EF4-FFF2-40B4-BE49-F238E27FC236}">
+                <a16:creationId xmlns:a16="http://schemas.microsoft.com/office/drawing/2014/main" id="{D00EA85E-08E4-A942-887F-71BDC8D5096B}"/>
+              </a:ext>
+            </a:extLst>
+          </p:cNvPr>
+          <p:cNvSpPr txBox="1">
+            <a:spLocks noGrp="1"/>
+          </p:cNvSpPr>
+          <p:nvPr>
+            <p:ph type="body" sz="quarter" idx="1"/>
+          </p:nvPr>
+        </p:nvSpPr>
+        <p:spPr/>
+        <p:txBody>
+          <a:bodyPr/>
+          <a:lstStyle/>
+          <a:p>
+            <a:endParaRPr lang="en-US"/>
+          </a:p>
+        </p:txBody>
+      </p:sp>
+    </p:spTree>
+  </p:cSld>
+  <p:clrMapOvr>
+    <a:masterClrMapping/>
+  </p:clrMapOvr>
+</p:notes>
+</file>
+
+<file path=ppt/notesSlides/notesSlide17.xml><?xml version="1.0" encoding="utf-8"?>
+<p:notes xmlns:a="http://schemas.openxmlformats.org/drawingml/2006/main" xmlns:r="http://schemas.openxmlformats.org/officeDocument/2006/relationships" xmlns:p="http://schemas.openxmlformats.org/presentationml/2006/main">
+  <p:cSld>
+    <p:spTree>
+      <p:nvGrpSpPr>
+        <p:cNvPr id="1" name=""/>
+        <p:cNvGrpSpPr/>
+        <p:nvPr/>
+      </p:nvGrpSpPr>
+      <p:grpSpPr>
+        <a:xfrm>
+          <a:off x="0" y="0"/>
+          <a:ext cx="0" cy="0"/>
+          <a:chOff x="0" y="0"/>
+          <a:chExt cx="0" cy="0"/>
+        </a:xfrm>
+      </p:grpSpPr>
+      <p:sp>
+        <p:nvSpPr>
+          <p:cNvPr id="7" name="Slide Number Placeholder 6">
+            <a:extLst>
+              <a:ext uri="{FF2B5EF4-FFF2-40B4-BE49-F238E27FC236}">
+                <a16:creationId xmlns:a16="http://schemas.microsoft.com/office/drawing/2014/main" id="{2F510149-13A2-124D-8AAA-822788858C6B}"/>
+              </a:ext>
+            </a:extLst>
+          </p:cNvPr>
+          <p:cNvSpPr txBox="1">
+            <a:spLocks noGrp="1"/>
+          </p:cNvSpPr>
+          <p:nvPr>
+            <p:ph type="sldNum" sz="quarter" idx="5"/>
+          </p:nvPr>
+        </p:nvSpPr>
+        <p:spPr>
+          <a:ln/>
+        </p:spPr>
+        <p:txBody>
+          <a:bodyPr lIns="0" tIns="0" rIns="0" bIns="0" anchor="b" anchorCtr="0">
+            <a:noAutofit/>
+          </a:bodyPr>
+          <a:lstStyle/>
+          <a:p>
+            <a:pPr lvl="0"/>
             <a:fld id="{022EFFB4-C9F4-E549-8EE2-F69750BB70A0}" type="slidenum">
-              <a:t>16</a:t>
+              <a:t>17</a:t>
             </a:fld>
             <a:endParaRPr lang="en-US"/>
           </a:p>
@@ -19240,7 +19361,7 @@
         </p:nvSpPr>
         <p:spPr>
           <a:xfrm>
-            <a:off x="2907609" y="3244334"/>
+            <a:off x="2907609" y="3210466"/>
             <a:ext cx="3714478" cy="523220"/>
           </a:xfrm>
           <a:prstGeom prst="rect">
@@ -19422,6 +19543,317 @@
 </file>
 
 <file path=ppt/slides/slide12.xml><?xml version="1.0" encoding="utf-8"?>
+<p:sld xmlns:a="http://schemas.openxmlformats.org/drawingml/2006/main" xmlns:r="http://schemas.openxmlformats.org/officeDocument/2006/relationships" xmlns:p="http://schemas.openxmlformats.org/presentationml/2006/main">
+  <p:cSld>
+    <p:spTree>
+      <p:nvGrpSpPr>
+        <p:cNvPr id="1" name=""/>
+        <p:cNvGrpSpPr/>
+        <p:nvPr/>
+      </p:nvGrpSpPr>
+      <p:grpSpPr>
+        <a:xfrm>
+          <a:off x="0" y="0"/>
+          <a:ext cx="0" cy="0"/>
+          <a:chOff x="0" y="0"/>
+          <a:chExt cx="0" cy="0"/>
+        </a:xfrm>
+      </p:grpSpPr>
+      <p:sp>
+        <p:nvSpPr>
+          <p:cNvPr id="2" name="Rectangle 4">
+            <a:extLst>
+              <a:ext uri="{FF2B5EF4-FFF2-40B4-BE49-F238E27FC236}">
+                <a16:creationId xmlns:a16="http://schemas.microsoft.com/office/drawing/2014/main" id="{31BB8F32-9007-5D4E-B29A-F9B0D9A3B5E3}"/>
+              </a:ext>
+            </a:extLst>
+          </p:cNvPr>
+          <p:cNvSpPr txBox="1">
+            <a:spLocks noGrp="1"/>
+          </p:cNvSpPr>
+          <p:nvPr>
+            <p:ph type="title" idx="4294967295"/>
+          </p:nvPr>
+        </p:nvSpPr>
+        <p:spPr>
+          <a:xfrm>
+            <a:off x="380880" y="361799"/>
+            <a:ext cx="8580240" cy="1204920"/>
+          </a:xfrm>
+          <a:noFill/>
+          <a:ln>
+            <a:noFill/>
+          </a:ln>
+        </p:spPr>
+        <p:txBody>
+          <a:bodyPr lIns="0" tIns="0" rIns="0" bIns="0"/>
+          <a:lstStyle/>
+          <a:p>
+            <a:pPr lvl="0">
+              <a:lnSpc>
+                <a:spcPct val="85000"/>
+              </a:lnSpc>
+              <a:spcBef>
+                <a:spcPts val="0"/>
+              </a:spcBef>
+            </a:pPr>
+            <a:r>
+              <a:rPr lang="en-US" b="1" spc="-48" dirty="0">
+                <a:solidFill>
+                  <a:srgbClr val="C00000"/>
+                </a:solidFill>
+                <a:highlight>
+                  <a:scrgbClr r="0" g="0" b="0">
+                    <a:alpha val="0"/>
+                  </a:scrgbClr>
+                </a:highlight>
+                <a:latin typeface="Calibri Light"/>
+              </a:rPr>
+              <a:t>Model-based </a:t>
+            </a:r>
+            <a:r>
+              <a:rPr lang="en-US" b="1" spc="-48" dirty="0" err="1">
+                <a:solidFill>
+                  <a:srgbClr val="C00000"/>
+                </a:solidFill>
+                <a:highlight>
+                  <a:scrgbClr r="0" g="0" b="0">
+                    <a:alpha val="0"/>
+                  </a:scrgbClr>
+                </a:highlight>
+                <a:latin typeface="Calibri Light"/>
+              </a:rPr>
+              <a:t>geostatistics</a:t>
+            </a:r>
+            <a:endParaRPr lang="en-US" b="1" spc="-48" dirty="0">
+              <a:solidFill>
+                <a:srgbClr val="C00000"/>
+              </a:solidFill>
+              <a:highlight>
+                <a:scrgbClr r="0" g="0" b="0">
+                  <a:alpha val="0"/>
+                </a:scrgbClr>
+              </a:highlight>
+              <a:latin typeface="Calibri Light"/>
+            </a:endParaRPr>
+          </a:p>
+        </p:txBody>
+      </p:sp>
+      <p:sp>
+        <p:nvSpPr>
+          <p:cNvPr id="3" name="Rectangle 5">
+            <a:extLst>
+              <a:ext uri="{FF2B5EF4-FFF2-40B4-BE49-F238E27FC236}">
+                <a16:creationId xmlns:a16="http://schemas.microsoft.com/office/drawing/2014/main" id="{00E07B29-4122-C74E-8447-0E8B5793CE99}"/>
+              </a:ext>
+            </a:extLst>
+          </p:cNvPr>
+          <p:cNvSpPr txBox="1">
+            <a:spLocks noGrp="1"/>
+          </p:cNvSpPr>
+          <p:nvPr>
+            <p:ph type="body" idx="4294967295"/>
+          </p:nvPr>
+        </p:nvSpPr>
+        <p:spPr>
+          <a:xfrm>
+            <a:off x="458279" y="1679039"/>
+            <a:ext cx="7039800" cy="4173120"/>
+          </a:xfrm>
+          <a:noFill/>
+          <a:ln>
+            <a:noFill/>
+          </a:ln>
+        </p:spPr>
+        <p:txBody>
+          <a:bodyPr wrap="square" lIns="0" rIns="0" anchor="t">
+            <a:noAutofit/>
+          </a:bodyPr>
+          <a:lstStyle/>
+          <a:p>
+            <a:pPr marL="0" lvl="0" indent="0">
+              <a:spcBef>
+                <a:spcPts val="1199"/>
+              </a:spcBef>
+              <a:spcAft>
+                <a:spcPts val="201"/>
+              </a:spcAft>
+              <a:buClr>
+                <a:srgbClr val="1CADE4"/>
+              </a:buClr>
+              <a:buSzPct val="100000"/>
+              <a:buFont typeface="Calibri" pitchFamily="34"/>
+              <a:buChar char=" "/>
+            </a:pPr>
+            <a:r>
+              <a:rPr lang="en-US" sz="2400" dirty="0">
+                <a:solidFill>
+                  <a:srgbClr val="404040"/>
+                </a:solidFill>
+                <a:highlight>
+                  <a:scrgbClr r="0" g="0" b="0">
+                    <a:alpha val="0"/>
+                  </a:scrgbClr>
+                </a:highlight>
+                <a:latin typeface="Calibri"/>
+              </a:rPr>
+              <a:t>Like a GLM, but we can add a spatially correlated random effect. </a:t>
+            </a:r>
+          </a:p>
+          <a:p>
+            <a:pPr marL="0" lvl="0" indent="0">
+              <a:spcBef>
+                <a:spcPts val="1199"/>
+              </a:spcBef>
+              <a:spcAft>
+                <a:spcPts val="201"/>
+              </a:spcAft>
+              <a:buClr>
+                <a:srgbClr val="1CADE4"/>
+              </a:buClr>
+              <a:buSzPct val="100000"/>
+              <a:buFont typeface="Calibri" pitchFamily="34"/>
+              <a:buChar char=" "/>
+            </a:pPr>
+            <a:endParaRPr lang="en-US" sz="2400" dirty="0">
+              <a:solidFill>
+                <a:srgbClr val="404040"/>
+              </a:solidFill>
+              <a:highlight>
+                <a:scrgbClr r="0" g="0" b="0">
+                  <a:alpha val="0"/>
+                </a:scrgbClr>
+              </a:highlight>
+              <a:latin typeface="Calibri"/>
+            </a:endParaRPr>
+          </a:p>
+        </p:txBody>
+      </p:sp>
+      <p:pic>
+        <p:nvPicPr>
+          <p:cNvPr id="6" name="Picture 5">
+            <a:extLst>
+              <a:ext uri="{FF2B5EF4-FFF2-40B4-BE49-F238E27FC236}">
+                <a16:creationId xmlns:a16="http://schemas.microsoft.com/office/drawing/2014/main" id="{3825ED9E-5E1B-074A-9EBE-E0C5B79BC961}"/>
+              </a:ext>
+            </a:extLst>
+          </p:cNvPr>
+          <p:cNvPicPr>
+            <a:picLocks noChangeAspect="1"/>
+          </p:cNvPicPr>
+          <p:nvPr/>
+        </p:nvPicPr>
+        <p:blipFill>
+          <a:blip r:embed="rId3"/>
+          <a:stretch>
+            <a:fillRect/>
+          </a:stretch>
+        </p:blipFill>
+        <p:spPr>
+          <a:xfrm>
+            <a:off x="1232746" y="2535080"/>
+            <a:ext cx="6527800" cy="3124200"/>
+          </a:xfrm>
+          <a:prstGeom prst="rect">
+            <a:avLst/>
+          </a:prstGeom>
+        </p:spPr>
+      </p:pic>
+      <p:sp>
+        <p:nvSpPr>
+          <p:cNvPr id="7" name="Rectangle 6">
+            <a:extLst>
+              <a:ext uri="{FF2B5EF4-FFF2-40B4-BE49-F238E27FC236}">
+                <a16:creationId xmlns:a16="http://schemas.microsoft.com/office/drawing/2014/main" id="{7245197A-C095-8E44-A026-196198F2A238}"/>
+              </a:ext>
+            </a:extLst>
+          </p:cNvPr>
+          <p:cNvSpPr/>
+          <p:nvPr/>
+        </p:nvSpPr>
+        <p:spPr>
+          <a:xfrm>
+            <a:off x="2286000" y="6027477"/>
+            <a:ext cx="4572000" cy="600164"/>
+          </a:xfrm>
+          <a:prstGeom prst="rect">
+            <a:avLst/>
+          </a:prstGeom>
+        </p:spPr>
+        <p:txBody>
+          <a:bodyPr>
+            <a:spAutoFit/>
+          </a:bodyPr>
+          <a:lstStyle/>
+          <a:p>
+            <a:r>
+              <a:rPr lang="en-US" sz="1100" b="0" i="0" dirty="0">
+                <a:solidFill>
+                  <a:srgbClr val="222222"/>
+                </a:solidFill>
+                <a:effectLst/>
+                <a:latin typeface="Arial" panose="020B0604020202020204" pitchFamily="34" charset="0"/>
+              </a:rPr>
+              <a:t>Diggle PJ, Ribeiro PJ, Christensen OF. An introduction to model-based </a:t>
+            </a:r>
+            <a:r>
+              <a:rPr lang="en-US" sz="1100" b="0" i="0" dirty="0" err="1">
+                <a:solidFill>
+                  <a:srgbClr val="222222"/>
+                </a:solidFill>
+                <a:effectLst/>
+                <a:latin typeface="Arial" panose="020B0604020202020204" pitchFamily="34" charset="0"/>
+              </a:rPr>
+              <a:t>geostatistics</a:t>
+            </a:r>
+            <a:r>
+              <a:rPr lang="en-US" sz="1100" b="0" i="0" dirty="0">
+                <a:solidFill>
+                  <a:srgbClr val="222222"/>
+                </a:solidFill>
+                <a:effectLst/>
+                <a:latin typeface="Arial" panose="020B0604020202020204" pitchFamily="34" charset="0"/>
+              </a:rPr>
+              <a:t>. </a:t>
+            </a:r>
+            <a:r>
+              <a:rPr lang="en-US" sz="1100" b="0" i="0" dirty="0" err="1">
+                <a:solidFill>
+                  <a:srgbClr val="222222"/>
+                </a:solidFill>
+                <a:effectLst/>
+                <a:latin typeface="Arial" panose="020B0604020202020204" pitchFamily="34" charset="0"/>
+              </a:rPr>
+              <a:t>InSpatial</a:t>
+            </a:r>
+            <a:r>
+              <a:rPr lang="en-US" sz="1100" b="0" i="0" dirty="0">
+                <a:solidFill>
+                  <a:srgbClr val="222222"/>
+                </a:solidFill>
+                <a:effectLst/>
+                <a:latin typeface="Arial" panose="020B0604020202020204" pitchFamily="34" charset="0"/>
+              </a:rPr>
+              <a:t> statistics and computational methods 2003 (pp. 43-86). Springer, New York, NY.</a:t>
+            </a:r>
+            <a:endParaRPr lang="en-US" sz="1100" dirty="0"/>
+          </a:p>
+        </p:txBody>
+      </p:sp>
+    </p:spTree>
+    <p:extLst>
+      <p:ext uri="{BB962C8B-B14F-4D97-AF65-F5344CB8AC3E}">
+        <p14:creationId xmlns:p14="http://schemas.microsoft.com/office/powerpoint/2010/main" val="886447149"/>
+      </p:ext>
+    </p:extLst>
+  </p:cSld>
+  <p:clrMapOvr>
+    <a:masterClrMapping/>
+  </p:clrMapOvr>
+</p:sld>
+</file>
+
+<file path=ppt/slides/slide13.xml><?xml version="1.0" encoding="utf-8"?>
 <p:sld xmlns:a="http://schemas.openxmlformats.org/drawingml/2006/main" xmlns:r="http://schemas.openxmlformats.org/officeDocument/2006/relationships" xmlns:p="http://schemas.openxmlformats.org/presentationml/2006/main">
   <p:cSld name="page12">
     <p:spTree>
@@ -19602,7 +20034,7 @@
 </p:sld>
 </file>
 
-<file path=ppt/slides/slide13.xml><?xml version="1.0" encoding="utf-8"?>
+<file path=ppt/slides/slide14.xml><?xml version="1.0" encoding="utf-8"?>
 <p:sld xmlns:a="http://schemas.openxmlformats.org/drawingml/2006/main" xmlns:r="http://schemas.openxmlformats.org/officeDocument/2006/relationships" xmlns:p="http://schemas.openxmlformats.org/presentationml/2006/main">
   <p:cSld name="page13">
     <p:spTree>
@@ -19720,7 +20152,7 @@
 </p:sld>
 </file>
 
-<file path=ppt/slides/slide14.xml><?xml version="1.0" encoding="utf-8"?>
+<file path=ppt/slides/slide15.xml><?xml version="1.0" encoding="utf-8"?>
 <p:sld xmlns:a="http://schemas.openxmlformats.org/drawingml/2006/main" xmlns:r="http://schemas.openxmlformats.org/officeDocument/2006/relationships" xmlns:p="http://schemas.openxmlformats.org/presentationml/2006/main">
   <p:cSld name="page14">
     <p:spTree>
@@ -19958,7 +20390,7 @@
 </p:sld>
 </file>
 
-<file path=ppt/slides/slide15.xml><?xml version="1.0" encoding="utf-8"?>
+<file path=ppt/slides/slide16.xml><?xml version="1.0" encoding="utf-8"?>
 <p:sld xmlns:a="http://schemas.openxmlformats.org/drawingml/2006/main" xmlns:r="http://schemas.openxmlformats.org/officeDocument/2006/relationships" xmlns:p="http://schemas.openxmlformats.org/presentationml/2006/main">
   <p:cSld name="page15">
     <p:spTree>
@@ -20610,7 +21042,7 @@
 </p:sld>
 </file>
 
-<file path=ppt/slides/slide16.xml><?xml version="1.0" encoding="utf-8"?>
+<file path=ppt/slides/slide17.xml><?xml version="1.0" encoding="utf-8"?>
 <p:sld xmlns:a="http://schemas.openxmlformats.org/drawingml/2006/main" xmlns:r="http://schemas.openxmlformats.org/officeDocument/2006/relationships" xmlns:p="http://schemas.openxmlformats.org/presentationml/2006/main">
   <p:cSld name="page16">
     <p:spTree>

</xml_diff>